<commit_message>
Update Final presentation B+D+T.pptx
Finished
</commit_message>
<xml_diff>
--- a/Final presentation B+D+T.pptx
+++ b/Final presentation B+D+T.pptx
@@ -16,6 +16,8 @@
     <p:sldId id="274" r:id="rId10"/>
     <p:sldId id="273" r:id="rId11"/>
     <p:sldId id="275" r:id="rId12"/>
+    <p:sldId id="276" r:id="rId13"/>
+    <p:sldId id="277" r:id="rId14"/>
   </p:sldIdLst>
   <p:sldSz cx="12192000" cy="6858000"/>
   <p:notesSz cx="6858000" cy="9144000"/>
@@ -4087,7 +4089,7 @@
           <a:p>
             <a:fld id="{4AAD347D-5ACD-4C99-B74B-A9C85AD731AF}" type="datetimeFigureOut">
               <a:rPr lang="en-US" smtClean="0"/>
-              <a:t>7/23/2019</a:t>
+              <a:t>7/24/2019</a:t>
             </a:fld>
             <a:endParaRPr lang="en-US" dirty="0"/>
           </a:p>
@@ -4155,7 +4157,7 @@
           <a:p>
             <a:fld id="{D57F1E4F-1CFF-5643-939E-02111984F565}" type="slidenum">
               <a:rPr lang="en-US" smtClean="0"/>
-              <a:t>‹#›</a:t>
+              <a:t>‹Nr.›</a:t>
             </a:fld>
             <a:endParaRPr lang="en-US" dirty="0"/>
           </a:p>
@@ -4417,7 +4419,7 @@
           <a:p>
             <a:fld id="{4509A250-FF31-4206-8172-F9D3106AACB1}" type="datetimeFigureOut">
               <a:rPr lang="en-US" smtClean="0"/>
-              <a:t>7/23/2019</a:t>
+              <a:t>7/24/2019</a:t>
             </a:fld>
             <a:endParaRPr lang="en-US" dirty="0"/>
           </a:p>
@@ -4459,7 +4461,7 @@
           <a:p>
             <a:fld id="{D57F1E4F-1CFF-5643-939E-02111984F565}" type="slidenum">
               <a:rPr lang="en-US" smtClean="0"/>
-              <a:t>‹#›</a:t>
+              <a:t>‹Nr.›</a:t>
             </a:fld>
             <a:endParaRPr lang="en-US" dirty="0"/>
           </a:p>
@@ -4597,7 +4599,7 @@
           <a:p>
             <a:fld id="{4509A250-FF31-4206-8172-F9D3106AACB1}" type="datetimeFigureOut">
               <a:rPr lang="en-US" smtClean="0"/>
-              <a:t>7/23/2019</a:t>
+              <a:t>7/24/2019</a:t>
             </a:fld>
             <a:endParaRPr lang="en-US" dirty="0"/>
           </a:p>
@@ -4639,7 +4641,7 @@
           <a:p>
             <a:fld id="{D57F1E4F-1CFF-5643-939E-02111984F565}" type="slidenum">
               <a:rPr lang="en-US" smtClean="0"/>
-              <a:t>‹#›</a:t>
+              <a:t>‹Nr.›</a:t>
             </a:fld>
             <a:endParaRPr lang="en-US" dirty="0"/>
           </a:p>
@@ -4767,7 +4769,7 @@
           <a:p>
             <a:fld id="{4509A250-FF31-4206-8172-F9D3106AACB1}" type="datetimeFigureOut">
               <a:rPr lang="en-US" smtClean="0"/>
-              <a:t>7/23/2019</a:t>
+              <a:t>7/24/2019</a:t>
             </a:fld>
             <a:endParaRPr lang="en-US" dirty="0"/>
           </a:p>
@@ -4809,7 +4811,7 @@
           <a:p>
             <a:fld id="{D57F1E4F-1CFF-5643-939E-02111984F565}" type="slidenum">
               <a:rPr lang="en-US" smtClean="0"/>
-              <a:t>‹#›</a:t>
+              <a:t>‹Nr.›</a:t>
             </a:fld>
             <a:endParaRPr lang="en-US" dirty="0"/>
           </a:p>
@@ -5044,7 +5046,7 @@
           <a:p>
             <a:fld id="{9796027F-7875-4030-9381-8BD8C4F21935}" type="datetimeFigureOut">
               <a:rPr lang="en-US" smtClean="0"/>
-              <a:t>7/23/2019</a:t>
+              <a:t>7/24/2019</a:t>
             </a:fld>
             <a:endParaRPr lang="en-US" dirty="0"/>
           </a:p>
@@ -5112,7 +5114,7 @@
           <a:p>
             <a:fld id="{D57F1E4F-1CFF-5643-939E-02111984F565}" type="slidenum">
               <a:rPr lang="en-US" smtClean="0"/>
-              <a:t>‹#›</a:t>
+              <a:t>‹Nr.›</a:t>
             </a:fld>
             <a:endParaRPr lang="en-US" dirty="0"/>
           </a:p>
@@ -5438,7 +5440,7 @@
           <a:p>
             <a:fld id="{9796027F-7875-4030-9381-8BD8C4F21935}" type="datetimeFigureOut">
               <a:rPr lang="en-US" smtClean="0"/>
-              <a:t>7/23/2019</a:t>
+              <a:t>7/24/2019</a:t>
             </a:fld>
             <a:endParaRPr lang="en-US" dirty="0"/>
           </a:p>
@@ -5480,7 +5482,7 @@
           <a:p>
             <a:fld id="{D57F1E4F-1CFF-5643-939E-02111984F565}" type="slidenum">
               <a:rPr lang="en-US" smtClean="0"/>
-              <a:t>‹#›</a:t>
+              <a:t>‹Nr.›</a:t>
             </a:fld>
             <a:endParaRPr lang="en-US" dirty="0"/>
           </a:p>
@@ -5915,7 +5917,7 @@
           <a:p>
             <a:fld id="{9796027F-7875-4030-9381-8BD8C4F21935}" type="datetimeFigureOut">
               <a:rPr lang="en-US" smtClean="0"/>
-              <a:t>7/23/2019</a:t>
+              <a:t>7/24/2019</a:t>
             </a:fld>
             <a:endParaRPr lang="en-US" dirty="0"/>
           </a:p>
@@ -5957,7 +5959,7 @@
           <a:p>
             <a:fld id="{D57F1E4F-1CFF-5643-939E-02111984F565}" type="slidenum">
               <a:rPr lang="en-US" smtClean="0"/>
-              <a:t>‹#›</a:t>
+              <a:t>‹Nr.›</a:t>
             </a:fld>
             <a:endParaRPr lang="en-US" dirty="0"/>
           </a:p>
@@ -6033,7 +6035,7 @@
           <a:p>
             <a:fld id="{4509A250-FF31-4206-8172-F9D3106AACB1}" type="datetimeFigureOut">
               <a:rPr lang="en-US" smtClean="0"/>
-              <a:t>7/23/2019</a:t>
+              <a:t>7/24/2019</a:t>
             </a:fld>
             <a:endParaRPr lang="en-US" dirty="0"/>
           </a:p>
@@ -6075,7 +6077,7 @@
           <a:p>
             <a:fld id="{D57F1E4F-1CFF-5643-939E-02111984F565}" type="slidenum">
               <a:rPr lang="en-US" smtClean="0"/>
-              <a:t>‹#›</a:t>
+              <a:t>‹Nr.›</a:t>
             </a:fld>
             <a:endParaRPr lang="en-US" dirty="0"/>
           </a:p>
@@ -6128,7 +6130,7 @@
           <a:p>
             <a:fld id="{4509A250-FF31-4206-8172-F9D3106AACB1}" type="datetimeFigureOut">
               <a:rPr lang="en-US" smtClean="0"/>
-              <a:t>7/23/2019</a:t>
+              <a:t>7/24/2019</a:t>
             </a:fld>
             <a:endParaRPr lang="en-US" dirty="0"/>
           </a:p>
@@ -6170,7 +6172,7 @@
           <a:p>
             <a:fld id="{D57F1E4F-1CFF-5643-939E-02111984F565}" type="slidenum">
               <a:rPr lang="en-US" smtClean="0"/>
-              <a:t>‹#›</a:t>
+              <a:t>‹Nr.›</a:t>
             </a:fld>
             <a:endParaRPr lang="en-US" dirty="0"/>
           </a:p>
@@ -6474,7 +6476,7 @@
           <a:p>
             <a:fld id="{4509A250-FF31-4206-8172-F9D3106AACB1}" type="datetimeFigureOut">
               <a:rPr lang="en-US" smtClean="0"/>
-              <a:t>7/23/2019</a:t>
+              <a:t>7/24/2019</a:t>
             </a:fld>
             <a:endParaRPr lang="en-US" dirty="0"/>
           </a:p>
@@ -6542,7 +6544,7 @@
           <a:p>
             <a:fld id="{D57F1E4F-1CFF-5643-939E-02111984F565}" type="slidenum">
               <a:rPr lang="en-US" smtClean="0"/>
-              <a:t>‹#›</a:t>
+              <a:t>‹Nr.›</a:t>
             </a:fld>
             <a:endParaRPr lang="en-US" dirty="0"/>
           </a:p>
@@ -6862,7 +6864,7 @@
           <a:p>
             <a:fld id="{4509A250-FF31-4206-8172-F9D3106AACB1}" type="datetimeFigureOut">
               <a:rPr lang="en-US" smtClean="0"/>
-              <a:t>7/23/2019</a:t>
+              <a:t>7/24/2019</a:t>
             </a:fld>
             <a:endParaRPr lang="en-US" dirty="0"/>
           </a:p>
@@ -6930,7 +6932,7 @@
           <a:p>
             <a:fld id="{D57F1E4F-1CFF-5643-939E-02111984F565}" type="slidenum">
               <a:rPr lang="en-US" smtClean="0"/>
-              <a:t>‹#›</a:t>
+              <a:t>‹Nr.›</a:t>
             </a:fld>
             <a:endParaRPr lang="en-US" dirty="0"/>
           </a:p>
@@ -7140,7 +7142,7 @@
           <a:p>
             <a:fld id="{4AAD347D-5ACD-4C99-B74B-A9C85AD731AF}" type="datetimeFigureOut">
               <a:rPr lang="en-US" smtClean="0"/>
-              <a:t>7/23/2019</a:t>
+              <a:t>7/24/2019</a:t>
             </a:fld>
             <a:endParaRPr lang="en-US" dirty="0"/>
           </a:p>
@@ -7214,7 +7216,7 @@
           <a:p>
             <a:fld id="{D57F1E4F-1CFF-5643-939E-02111984F565}" type="slidenum">
               <a:rPr lang="en-US" smtClean="0"/>
-              <a:t>‹#›</a:t>
+              <a:t>‹Nr.›</a:t>
             </a:fld>
             <a:endParaRPr lang="en-US" dirty="0"/>
           </a:p>
@@ -8343,6 +8345,1066 @@
     <p:extLst>
       <p:ext uri="{BB962C8B-B14F-4D97-AF65-F5344CB8AC3E}">
         <p14:creationId xmlns:p14="http://schemas.microsoft.com/office/powerpoint/2010/main" val="1047856673"/>
+      </p:ext>
+    </p:extLst>
+  </p:cSld>
+  <p:clrMapOvr>
+    <a:masterClrMapping/>
+  </p:clrMapOvr>
+</p:sld>
+</file>
+
+<file path=ppt/slides/slide12.xml><?xml version="1.0" encoding="utf-8"?>
+<p:sld xmlns:a="http://schemas.openxmlformats.org/drawingml/2006/main" xmlns:r="http://schemas.openxmlformats.org/officeDocument/2006/relationships" xmlns:p="http://schemas.openxmlformats.org/presentationml/2006/main">
+  <p:cSld>
+    <p:spTree>
+      <p:nvGrpSpPr>
+        <p:cNvPr id="1" name=""/>
+        <p:cNvGrpSpPr/>
+        <p:nvPr/>
+      </p:nvGrpSpPr>
+      <p:grpSpPr>
+        <a:xfrm>
+          <a:off x="0" y="0"/>
+          <a:ext cx="0" cy="0"/>
+          <a:chOff x="0" y="0"/>
+          <a:chExt cx="0" cy="0"/>
+        </a:xfrm>
+      </p:grpSpPr>
+      <p:sp>
+        <p:nvSpPr>
+          <p:cNvPr id="2" name="Titel 1">
+            <a:extLst>
+              <a:ext uri="{FF2B5EF4-FFF2-40B4-BE49-F238E27FC236}">
+                <a16:creationId xmlns:a16="http://schemas.microsoft.com/office/drawing/2014/main" id="{93532AF0-498D-4CFD-AED2-E59236F470AE}"/>
+              </a:ext>
+            </a:extLst>
+          </p:cNvPr>
+          <p:cNvSpPr>
+            <a:spLocks noGrp="1"/>
+          </p:cNvSpPr>
+          <p:nvPr>
+            <p:ph type="title"/>
+          </p:nvPr>
+        </p:nvSpPr>
+        <p:spPr>
+          <a:xfrm>
+            <a:off x="968645" y="800100"/>
+            <a:ext cx="10820400" cy="1485900"/>
+          </a:xfrm>
+        </p:spPr>
+        <p:txBody>
+          <a:bodyPr/>
+          <a:lstStyle/>
+          <a:p>
+            <a:r>
+              <a:rPr lang="de-DE" b="1" dirty="0"/>
+              <a:t>WSS and </a:t>
+            </a:r>
+            <a:r>
+              <a:rPr lang="de-DE" b="1" dirty="0" err="1"/>
+              <a:t>Runtime</a:t>
+            </a:r>
+            <a:r>
+              <a:rPr lang="de-DE" b="1" dirty="0"/>
+              <a:t> </a:t>
+            </a:r>
+            <a:r>
+              <a:rPr lang="de-DE" b="1" dirty="0" err="1"/>
+              <a:t>comparison</a:t>
+            </a:r>
+            <a:r>
+              <a:rPr lang="de-DE" b="1" dirty="0"/>
+              <a:t> </a:t>
+            </a:r>
+            <a:r>
+              <a:rPr lang="de-DE" b="1" dirty="0" err="1"/>
+              <a:t>with</a:t>
+            </a:r>
+            <a:r>
+              <a:rPr lang="de-DE" b="1" dirty="0"/>
+              <a:t> </a:t>
+            </a:r>
+            <a:r>
+              <a:rPr lang="de-DE" b="1" dirty="0" err="1"/>
+              <a:t>sklearn</a:t>
+            </a:r>
+            <a:endParaRPr lang="de-DE" b="1" dirty="0"/>
+          </a:p>
+        </p:txBody>
+      </p:sp>
+      <p:graphicFrame>
+        <p:nvGraphicFramePr>
+          <p:cNvPr id="10" name="Inhaltsplatzhalter 9">
+            <a:extLst>
+              <a:ext uri="{FF2B5EF4-FFF2-40B4-BE49-F238E27FC236}">
+                <a16:creationId xmlns:a16="http://schemas.microsoft.com/office/drawing/2014/main" id="{28B03E06-945E-42FC-8D45-A34C50C29F64}"/>
+              </a:ext>
+            </a:extLst>
+          </p:cNvPr>
+          <p:cNvGraphicFramePr>
+            <a:graphicFrameLocks noGrp="1"/>
+          </p:cNvGraphicFramePr>
+          <p:nvPr>
+            <p:ph idx="1"/>
+            <p:extLst>
+              <p:ext uri="{D42A27DB-BD31-4B8C-83A1-F6EECF244321}">
+                <p14:modId xmlns:p14="http://schemas.microsoft.com/office/powerpoint/2010/main" val="3495125789"/>
+              </p:ext>
+            </p:extLst>
+          </p:nvPr>
+        </p:nvGraphicFramePr>
+        <p:xfrm>
+          <a:off x="968645" y="2286000"/>
+          <a:ext cx="6114081" cy="3886201"/>
+        </p:xfrm>
+        <a:graphic>
+          <a:graphicData uri="http://schemas.openxmlformats.org/drawingml/2006/table">
+            <a:tbl>
+              <a:tblPr firstRow="1" bandRow="1">
+                <a:tableStyleId>{073A0DAA-6AF3-43AB-8588-CEC1D06C72B9}</a:tableStyleId>
+              </a:tblPr>
+              <a:tblGrid>
+                <a:gridCol w="2038027">
+                  <a:extLst>
+                    <a:ext uri="{9D8B030D-6E8A-4147-A177-3AD203B41FA5}">
+                      <a16:colId xmlns:a16="http://schemas.microsoft.com/office/drawing/2014/main" val="1737324959"/>
+                    </a:ext>
+                  </a:extLst>
+                </a:gridCol>
+                <a:gridCol w="2038027">
+                  <a:extLst>
+                    <a:ext uri="{9D8B030D-6E8A-4147-A177-3AD203B41FA5}">
+                      <a16:colId xmlns:a16="http://schemas.microsoft.com/office/drawing/2014/main" val="1006271423"/>
+                    </a:ext>
+                  </a:extLst>
+                </a:gridCol>
+                <a:gridCol w="2038027">
+                  <a:extLst>
+                    <a:ext uri="{9D8B030D-6E8A-4147-A177-3AD203B41FA5}">
+                      <a16:colId xmlns:a16="http://schemas.microsoft.com/office/drawing/2014/main" val="1993004896"/>
+                    </a:ext>
+                  </a:extLst>
+                </a:gridCol>
+              </a:tblGrid>
+              <a:tr h="1261477">
+                <a:tc>
+                  <a:txBody>
+                    <a:bodyPr/>
+                    <a:lstStyle/>
+                    <a:p>
+                      <a:r>
+                        <a:rPr lang="de-DE" dirty="0"/>
+                        <a:t>Method</a:t>
+                      </a:r>
+                    </a:p>
+                  </a:txBody>
+                  <a:tcPr/>
+                </a:tc>
+                <a:tc>
+                  <a:txBody>
+                    <a:bodyPr/>
+                    <a:lstStyle/>
+                    <a:p>
+                      <a:r>
+                        <a:rPr lang="de-DE" dirty="0"/>
+                        <a:t>WSS Abweichung [%]</a:t>
+                      </a:r>
+                    </a:p>
+                  </a:txBody>
+                  <a:tcPr/>
+                </a:tc>
+                <a:tc>
+                  <a:txBody>
+                    <a:bodyPr/>
+                    <a:lstStyle/>
+                    <a:p>
+                      <a:r>
+                        <a:rPr lang="de-DE" dirty="0" err="1"/>
+                        <a:t>Runtime</a:t>
+                      </a:r>
+                      <a:r>
+                        <a:rPr lang="de-DE" dirty="0"/>
+                        <a:t> </a:t>
+                      </a:r>
+                      <a:r>
+                        <a:rPr lang="de-DE" dirty="0" err="1"/>
+                        <a:t>Difference</a:t>
+                      </a:r>
+                      <a:r>
+                        <a:rPr lang="de-DE" dirty="0"/>
+                        <a:t> [</a:t>
+                      </a:r>
+                      <a:r>
+                        <a:rPr lang="de-DE" dirty="0" err="1"/>
+                        <a:t>ms</a:t>
+                      </a:r>
+                      <a:r>
+                        <a:rPr lang="de-DE" dirty="0"/>
+                        <a:t>]</a:t>
+                      </a:r>
+                    </a:p>
+                  </a:txBody>
+                  <a:tcPr/>
+                </a:tc>
+                <a:extLst>
+                  <a:ext uri="{0D108BD9-81ED-4DB2-BD59-A6C34878D82A}">
+                    <a16:rowId xmlns:a16="http://schemas.microsoft.com/office/drawing/2014/main" val="813966048"/>
+                  </a:ext>
+                </a:extLst>
+              </a:tr>
+              <a:tr h="874908">
+                <a:tc>
+                  <a:txBody>
+                    <a:bodyPr/>
+                    <a:lstStyle/>
+                    <a:p>
+                      <a:r>
+                        <a:rPr lang="de-DE" dirty="0"/>
+                        <a:t>Basic K-</a:t>
+                      </a:r>
+                      <a:r>
+                        <a:rPr lang="de-DE" dirty="0" err="1"/>
+                        <a:t>means</a:t>
+                      </a:r>
+                      <a:endParaRPr lang="de-DE" dirty="0"/>
+                    </a:p>
+                  </a:txBody>
+                  <a:tcPr/>
+                </a:tc>
+                <a:tc>
+                  <a:txBody>
+                    <a:bodyPr/>
+                    <a:lstStyle/>
+                    <a:p>
+                      <a:r>
+                        <a:rPr lang="de-DE" dirty="0"/>
+                        <a:t>8,72*10^ -8  </a:t>
+                      </a:r>
+                    </a:p>
+                  </a:txBody>
+                  <a:tcPr/>
+                </a:tc>
+                <a:tc>
+                  <a:txBody>
+                    <a:bodyPr/>
+                    <a:lstStyle/>
+                    <a:p>
+                      <a:r>
+                        <a:rPr lang="de-DE" dirty="0"/>
+                        <a:t>-8,65</a:t>
+                      </a:r>
+                    </a:p>
+                  </a:txBody>
+                  <a:tcPr/>
+                </a:tc>
+                <a:extLst>
+                  <a:ext uri="{0D108BD9-81ED-4DB2-BD59-A6C34878D82A}">
+                    <a16:rowId xmlns:a16="http://schemas.microsoft.com/office/drawing/2014/main" val="3664565837"/>
+                  </a:ext>
+                </a:extLst>
+              </a:tr>
+              <a:tr h="874908">
+                <a:tc>
+                  <a:txBody>
+                    <a:bodyPr/>
+                    <a:lstStyle/>
+                    <a:p>
+                      <a:r>
+                        <a:rPr lang="de-DE" dirty="0"/>
+                        <a:t>Mini-batch K-</a:t>
+                      </a:r>
+                      <a:r>
+                        <a:rPr lang="de-DE" dirty="0" err="1"/>
+                        <a:t>means</a:t>
+                      </a:r>
+                      <a:endParaRPr lang="de-DE" dirty="0"/>
+                    </a:p>
+                  </a:txBody>
+                  <a:tcPr/>
+                </a:tc>
+                <a:tc>
+                  <a:txBody>
+                    <a:bodyPr/>
+                    <a:lstStyle/>
+                    <a:p>
+                      <a:r>
+                        <a:rPr lang="de-DE" dirty="0"/>
+                        <a:t>2,02*10^ -4 </a:t>
+                      </a:r>
+                    </a:p>
+                  </a:txBody>
+                  <a:tcPr/>
+                </a:tc>
+                <a:tc>
+                  <a:txBody>
+                    <a:bodyPr/>
+                    <a:lstStyle/>
+                    <a:p>
+                      <a:r>
+                        <a:rPr lang="de-DE" dirty="0"/>
+                        <a:t>-5,48</a:t>
+                      </a:r>
+                    </a:p>
+                  </a:txBody>
+                  <a:tcPr/>
+                </a:tc>
+                <a:extLst>
+                  <a:ext uri="{0D108BD9-81ED-4DB2-BD59-A6C34878D82A}">
+                    <a16:rowId xmlns:a16="http://schemas.microsoft.com/office/drawing/2014/main" val="247324644"/>
+                  </a:ext>
+                </a:extLst>
+              </a:tr>
+              <a:tr h="874908">
+                <a:tc>
+                  <a:txBody>
+                    <a:bodyPr/>
+                    <a:lstStyle/>
+                    <a:p>
+                      <a:r>
+                        <a:rPr lang="de-DE" dirty="0"/>
+                        <a:t>K++ </a:t>
+                      </a:r>
+                    </a:p>
+                  </a:txBody>
+                  <a:tcPr/>
+                </a:tc>
+                <a:tc>
+                  <a:txBody>
+                    <a:bodyPr/>
+                    <a:lstStyle/>
+                    <a:p>
+                      <a:r>
+                        <a:rPr lang="de-DE" dirty="0"/>
+                        <a:t>3,47 *10^ -7</a:t>
+                      </a:r>
+                    </a:p>
+                  </a:txBody>
+                  <a:tcPr/>
+                </a:tc>
+                <a:tc>
+                  <a:txBody>
+                    <a:bodyPr/>
+                    <a:lstStyle/>
+                    <a:p>
+                      <a:pPr marL="0" marR="0" lvl="0" indent="0" algn="l" defTabSz="914400" rtl="0" eaLnBrk="1" fontAlgn="auto" latinLnBrk="0" hangingPunct="1">
+                        <a:lnSpc>
+                          <a:spcPct val="100000"/>
+                        </a:lnSpc>
+                        <a:spcBef>
+                          <a:spcPts val="0"/>
+                        </a:spcBef>
+                        <a:spcAft>
+                          <a:spcPts val="0"/>
+                        </a:spcAft>
+                        <a:buClrTx/>
+                        <a:buSzTx/>
+                        <a:buFontTx/>
+                        <a:buNone/>
+                        <a:tabLst/>
+                        <a:defRPr/>
+                      </a:pPr>
+                      <a:r>
+                        <a:rPr lang="de-DE" dirty="0"/>
+                        <a:t>-7,75</a:t>
+                      </a:r>
+                    </a:p>
+                  </a:txBody>
+                  <a:tcPr/>
+                </a:tc>
+                <a:extLst>
+                  <a:ext uri="{0D108BD9-81ED-4DB2-BD59-A6C34878D82A}">
+                    <a16:rowId xmlns:a16="http://schemas.microsoft.com/office/drawing/2014/main" val="2602347269"/>
+                  </a:ext>
+                </a:extLst>
+              </a:tr>
+            </a:tbl>
+          </a:graphicData>
+        </a:graphic>
+      </p:graphicFrame>
+      <p:pic>
+        <p:nvPicPr>
+          <p:cNvPr id="11" name="Grafik 10">
+            <a:extLst>
+              <a:ext uri="{FF2B5EF4-FFF2-40B4-BE49-F238E27FC236}">
+                <a16:creationId xmlns:a16="http://schemas.microsoft.com/office/drawing/2014/main" id="{D511E1ED-DA0C-4D9B-BCEB-CD2F77CA106D}"/>
+              </a:ext>
+            </a:extLst>
+          </p:cNvPr>
+          <p:cNvPicPr>
+            <a:picLocks noChangeAspect="1"/>
+          </p:cNvPicPr>
+          <p:nvPr/>
+        </p:nvPicPr>
+        <p:blipFill>
+          <a:blip r:embed="rId2"/>
+          <a:stretch>
+            <a:fillRect/>
+          </a:stretch>
+        </p:blipFill>
+        <p:spPr>
+          <a:xfrm>
+            <a:off x="7144720" y="4039917"/>
+            <a:ext cx="4773478" cy="331911"/>
+          </a:xfrm>
+          <a:prstGeom prst="rect">
+            <a:avLst/>
+          </a:prstGeom>
+        </p:spPr>
+      </p:pic>
+    </p:spTree>
+    <p:extLst>
+      <p:ext uri="{BB962C8B-B14F-4D97-AF65-F5344CB8AC3E}">
+        <p14:creationId xmlns:p14="http://schemas.microsoft.com/office/powerpoint/2010/main" val="1072031518"/>
+      </p:ext>
+    </p:extLst>
+  </p:cSld>
+  <p:clrMapOvr>
+    <a:masterClrMapping/>
+  </p:clrMapOvr>
+</p:sld>
+</file>
+
+<file path=ppt/slides/slide13.xml><?xml version="1.0" encoding="utf-8"?>
+<p:sld xmlns:a="http://schemas.openxmlformats.org/drawingml/2006/main" xmlns:r="http://schemas.openxmlformats.org/officeDocument/2006/relationships" xmlns:p="http://schemas.openxmlformats.org/presentationml/2006/main">
+  <p:cSld>
+    <p:bg>
+      <p:bgPr>
+        <a:solidFill>
+          <a:schemeClr val="bg2"/>
+        </a:solidFill>
+        <a:effectLst/>
+      </p:bgPr>
+    </p:bg>
+    <p:spTree>
+      <p:nvGrpSpPr>
+        <p:cNvPr id="1" name=""/>
+        <p:cNvGrpSpPr/>
+        <p:nvPr/>
+      </p:nvGrpSpPr>
+      <p:grpSpPr>
+        <a:xfrm>
+          <a:off x="0" y="0"/>
+          <a:ext cx="0" cy="0"/>
+          <a:chOff x="0" y="0"/>
+          <a:chExt cx="0" cy="0"/>
+        </a:xfrm>
+      </p:grpSpPr>
+      <p:grpSp>
+        <p:nvGrpSpPr>
+          <p:cNvPr id="1034" name="Group 76">
+            <a:extLst>
+              <a:ext uri="{FF2B5EF4-FFF2-40B4-BE49-F238E27FC236}">
+                <a16:creationId xmlns:a16="http://schemas.microsoft.com/office/drawing/2014/main" id="{57500303-A207-4812-BEB9-51E132FEB73F}"/>
+              </a:ext>
+              <a:ext uri="{C183D7F6-B498-43B3-948B-1728B52AA6E4}">
+                <adec:decorative xmlns:adec="http://schemas.microsoft.com/office/drawing/2017/decorative" val="1"/>
+              </a:ext>
+            </a:extLst>
+          </p:cNvPr>
+          <p:cNvGrpSpPr>
+            <a:grpSpLocks noGrp="1" noUngrp="1" noRot="1" noChangeAspect="1" noMove="1" noResize="1"/>
+          </p:cNvGrpSpPr>
+          <p:nvPr>
+            <p:extLst>
+              <p:ext uri="{386F3935-93C4-4BCD-93E2-E3B085C9AB24}">
+                <p16:designElem xmlns:p16="http://schemas.microsoft.com/office/powerpoint/2015/main" val="1"/>
+              </p:ext>
+            </p:extLst>
+          </p:nvPr>
+        </p:nvGrpSpPr>
+        <p:grpSpPr>
+          <a:xfrm>
+            <a:off x="752858" y="744469"/>
+            <a:ext cx="10674117" cy="5349671"/>
+            <a:chOff x="752858" y="744469"/>
+            <a:chExt cx="10674117" cy="5349671"/>
+          </a:xfrm>
+        </p:grpSpPr>
+        <p:sp>
+          <p:nvSpPr>
+            <p:cNvPr id="78" name="Freeform 6">
+              <a:extLst>
+                <a:ext uri="{FF2B5EF4-FFF2-40B4-BE49-F238E27FC236}">
+                  <a16:creationId xmlns:a16="http://schemas.microsoft.com/office/drawing/2014/main" id="{10118C91-C025-4776-BE95-E9926378E790}"/>
+                </a:ext>
+                <a:ext uri="{C183D7F6-B498-43B3-948B-1728B52AA6E4}">
+                  <adec:decorative xmlns:adec="http://schemas.microsoft.com/office/drawing/2017/decorative" val="1"/>
+                </a:ext>
+              </a:extLst>
+            </p:cNvPr>
+            <p:cNvSpPr/>
+            <p:nvPr>
+              <p:extLst>
+                <p:ext uri="{386F3935-93C4-4BCD-93E2-E3B085C9AB24}">
+                  <p16:designElem xmlns:p16="http://schemas.microsoft.com/office/powerpoint/2015/main" val="1"/>
+                </p:ext>
+              </p:extLst>
+            </p:nvPr>
+          </p:nvSpPr>
+          <p:spPr bwMode="auto">
+            <a:xfrm>
+              <a:off x="8151962" y="1685652"/>
+              <a:ext cx="3275013" cy="4408488"/>
+            </a:xfrm>
+            <a:custGeom>
+              <a:avLst/>
+              <a:gdLst/>
+              <a:ahLst/>
+              <a:cxnLst/>
+              <a:rect l="l" t="t" r="r" b="b"/>
+              <a:pathLst>
+                <a:path w="10000" h="10000">
+                  <a:moveTo>
+                    <a:pt x="8761" y="0"/>
+                  </a:moveTo>
+                  <a:lnTo>
+                    <a:pt x="10000" y="0"/>
+                  </a:lnTo>
+                  <a:lnTo>
+                    <a:pt x="10000" y="10000"/>
+                  </a:lnTo>
+                  <a:lnTo>
+                    <a:pt x="0" y="10000"/>
+                  </a:lnTo>
+                  <a:lnTo>
+                    <a:pt x="0" y="9126"/>
+                  </a:lnTo>
+                  <a:lnTo>
+                    <a:pt x="8761" y="9127"/>
+                  </a:lnTo>
+                  <a:lnTo>
+                    <a:pt x="8761" y="0"/>
+                  </a:lnTo>
+                  <a:close/>
+                </a:path>
+              </a:pathLst>
+            </a:custGeom>
+            <a:solidFill>
+              <a:schemeClr val="tx2"/>
+            </a:solidFill>
+            <a:ln w="0">
+              <a:noFill/>
+              <a:prstDash val="solid"/>
+              <a:round/>
+              <a:headEnd/>
+              <a:tailEnd/>
+            </a:ln>
+          </p:spPr>
+        </p:sp>
+        <p:sp>
+          <p:nvSpPr>
+            <p:cNvPr id="79" name="Freeform 6">
+              <a:extLst>
+                <a:ext uri="{FF2B5EF4-FFF2-40B4-BE49-F238E27FC236}">
+                  <a16:creationId xmlns:a16="http://schemas.microsoft.com/office/drawing/2014/main" id="{339174D0-30E8-4BBF-BF81-5DDAC33C0C0E}"/>
+                </a:ext>
+                <a:ext uri="{C183D7F6-B498-43B3-948B-1728B52AA6E4}">
+                  <adec:decorative xmlns:adec="http://schemas.microsoft.com/office/drawing/2017/decorative" val="1"/>
+                </a:ext>
+              </a:extLst>
+            </p:cNvPr>
+            <p:cNvSpPr/>
+            <p:nvPr>
+              <p:extLst>
+                <p:ext uri="{386F3935-93C4-4BCD-93E2-E3B085C9AB24}">
+                  <p16:designElem xmlns:p16="http://schemas.microsoft.com/office/powerpoint/2015/main" val="1"/>
+                </p:ext>
+              </p:extLst>
+            </p:nvPr>
+          </p:nvSpPr>
+          <p:spPr bwMode="auto">
+            <a:xfrm flipH="1" flipV="1">
+              <a:off x="752858" y="744469"/>
+              <a:ext cx="3275668" cy="4408488"/>
+            </a:xfrm>
+            <a:custGeom>
+              <a:avLst/>
+              <a:gdLst/>
+              <a:ahLst/>
+              <a:cxnLst/>
+              <a:rect l="l" t="t" r="r" b="b"/>
+              <a:pathLst>
+                <a:path w="10002" h="10000">
+                  <a:moveTo>
+                    <a:pt x="8763" y="0"/>
+                  </a:moveTo>
+                  <a:lnTo>
+                    <a:pt x="10002" y="0"/>
+                  </a:lnTo>
+                  <a:lnTo>
+                    <a:pt x="10002" y="10000"/>
+                  </a:lnTo>
+                  <a:lnTo>
+                    <a:pt x="2" y="10000"/>
+                  </a:lnTo>
+                  <a:cubicBezTo>
+                    <a:pt x="-2" y="9698"/>
+                    <a:pt x="4" y="9427"/>
+                    <a:pt x="0" y="9125"/>
+                  </a:cubicBezTo>
+                  <a:lnTo>
+                    <a:pt x="8763" y="9128"/>
+                  </a:lnTo>
+                  <a:lnTo>
+                    <a:pt x="8763" y="0"/>
+                  </a:lnTo>
+                  <a:close/>
+                </a:path>
+              </a:pathLst>
+            </a:custGeom>
+            <a:solidFill>
+              <a:schemeClr val="tx2"/>
+            </a:solidFill>
+            <a:ln w="0">
+              <a:noFill/>
+              <a:prstDash val="solid"/>
+              <a:round/>
+              <a:headEnd/>
+              <a:tailEnd/>
+            </a:ln>
+          </p:spPr>
+        </p:sp>
+      </p:grpSp>
+      <p:sp useBgFill="1">
+        <p:nvSpPr>
+          <p:cNvPr id="1035" name="Rectangle 80">
+            <a:extLst>
+              <a:ext uri="{FF2B5EF4-FFF2-40B4-BE49-F238E27FC236}">
+                <a16:creationId xmlns:a16="http://schemas.microsoft.com/office/drawing/2014/main" id="{78511CAE-6AAD-4026-90B0-6917258C1C7E}"/>
+              </a:ext>
+              <a:ext uri="{C183D7F6-B498-43B3-948B-1728B52AA6E4}">
+                <adec:decorative xmlns:adec="http://schemas.microsoft.com/office/drawing/2017/decorative" val="1"/>
+              </a:ext>
+            </a:extLst>
+          </p:cNvPr>
+          <p:cNvSpPr>
+            <a:spLocks noGrp="1" noRot="1" noChangeAspect="1" noMove="1" noResize="1" noEditPoints="1" noAdjustHandles="1" noChangeArrowheads="1" noChangeShapeType="1" noTextEdit="1"/>
+          </p:cNvSpPr>
+          <p:nvPr>
+            <p:extLst>
+              <p:ext uri="{386F3935-93C4-4BCD-93E2-E3B085C9AB24}">
+                <p16:designElem xmlns:p16="http://schemas.microsoft.com/office/powerpoint/2015/main" val="1"/>
+              </p:ext>
+            </p:extLst>
+          </p:nvPr>
+        </p:nvSpPr>
+        <p:spPr>
+          <a:xfrm>
+            <a:off x="0" y="0"/>
+            <a:ext cx="12192000" cy="6858000"/>
+          </a:xfrm>
+          <a:prstGeom prst="rect">
+            <a:avLst/>
+          </a:prstGeom>
+          <a:ln>
+            <a:noFill/>
+          </a:ln>
+        </p:spPr>
+        <p:style>
+          <a:lnRef idx="2">
+            <a:schemeClr val="accent1">
+              <a:shade val="50000"/>
+            </a:schemeClr>
+          </a:lnRef>
+          <a:fillRef idx="1001">
+            <a:schemeClr val="lt2"/>
+          </a:fillRef>
+          <a:effectRef idx="0">
+            <a:schemeClr val="accent1"/>
+          </a:effectRef>
+          <a:fontRef idx="minor">
+            <a:schemeClr val="lt1"/>
+          </a:fontRef>
+        </p:style>
+        <p:txBody>
+          <a:bodyPr rtlCol="0" anchor="ctr"/>
+          <a:lstStyle/>
+          <a:p>
+            <a:pPr algn="ctr"/>
+            <a:endParaRPr lang="en-US"/>
+          </a:p>
+        </p:txBody>
+      </p:sp>
+      <p:sp>
+        <p:nvSpPr>
+          <p:cNvPr id="2" name="Titel 1">
+            <a:extLst>
+              <a:ext uri="{FF2B5EF4-FFF2-40B4-BE49-F238E27FC236}">
+                <a16:creationId xmlns:a16="http://schemas.microsoft.com/office/drawing/2014/main" id="{363C8D68-7FA9-4157-82DF-885175E88AA8}"/>
+              </a:ext>
+            </a:extLst>
+          </p:cNvPr>
+          <p:cNvSpPr>
+            <a:spLocks noGrp="1"/>
+          </p:cNvSpPr>
+          <p:nvPr>
+            <p:ph type="title"/>
+          </p:nvPr>
+        </p:nvSpPr>
+        <p:spPr>
+          <a:xfrm>
+            <a:off x="8154186" y="634028"/>
+            <a:ext cx="3355942" cy="3732835"/>
+          </a:xfrm>
+        </p:spPr>
+        <p:txBody>
+          <a:bodyPr vert="horz" lIns="91440" tIns="45720" rIns="91440" bIns="45720" rtlCol="0" anchor="b">
+            <a:normAutofit/>
+          </a:bodyPr>
+          <a:lstStyle/>
+          <a:p>
+            <a:r>
+              <a:rPr lang="en-US" sz="6000" b="1" cap="all"/>
+              <a:t>Random</a:t>
+            </a:r>
+            <a:r>
+              <a:rPr lang="en-US" sz="6000" cap="all"/>
+              <a:t> </a:t>
+            </a:r>
+            <a:r>
+              <a:rPr lang="en-US" sz="6000" b="1" cap="all"/>
+              <a:t>Data</a:t>
+            </a:r>
+          </a:p>
+        </p:txBody>
+      </p:sp>
+      <p:sp>
+        <p:nvSpPr>
+          <p:cNvPr id="1036" name="Freeform 6">
+            <a:extLst>
+              <a:ext uri="{FF2B5EF4-FFF2-40B4-BE49-F238E27FC236}">
+                <a16:creationId xmlns:a16="http://schemas.microsoft.com/office/drawing/2014/main" id="{7388763A-4025-4433-A72C-457FC3763E58}"/>
+              </a:ext>
+              <a:ext uri="{C183D7F6-B498-43B3-948B-1728B52AA6E4}">
+                <adec:decorative xmlns:adec="http://schemas.microsoft.com/office/drawing/2017/decorative" val="1"/>
+              </a:ext>
+            </a:extLst>
+          </p:cNvPr>
+          <p:cNvSpPr>
+            <a:spLocks noGrp="1" noRot="1" noChangeAspect="1" noMove="1" noResize="1" noEditPoints="1" noAdjustHandles="1" noChangeArrowheads="1" noChangeShapeType="1" noTextEdit="1"/>
+          </p:cNvSpPr>
+          <p:nvPr>
+            <p:extLst>
+              <p:ext uri="{386F3935-93C4-4BCD-93E2-E3B085C9AB24}">
+                <p16:designElem xmlns:p16="http://schemas.microsoft.com/office/powerpoint/2015/main" val="1"/>
+              </p:ext>
+            </p:extLst>
+          </p:nvPr>
+        </p:nvSpPr>
+        <p:spPr bwMode="auto">
+          <a:xfrm flipH="1" flipV="1">
+            <a:off x="649163" y="634028"/>
+            <a:ext cx="3275668" cy="4408488"/>
+          </a:xfrm>
+          <a:custGeom>
+            <a:avLst/>
+            <a:gdLst/>
+            <a:ahLst/>
+            <a:cxnLst/>
+            <a:rect l="l" t="t" r="r" b="b"/>
+            <a:pathLst>
+              <a:path w="10002" h="10000">
+                <a:moveTo>
+                  <a:pt x="8763" y="0"/>
+                </a:moveTo>
+                <a:lnTo>
+                  <a:pt x="10002" y="0"/>
+                </a:lnTo>
+                <a:lnTo>
+                  <a:pt x="10002" y="10000"/>
+                </a:lnTo>
+                <a:lnTo>
+                  <a:pt x="2" y="10000"/>
+                </a:lnTo>
+                <a:cubicBezTo>
+                  <a:pt x="-2" y="9698"/>
+                  <a:pt x="4" y="9427"/>
+                  <a:pt x="0" y="9125"/>
+                </a:cubicBezTo>
+                <a:lnTo>
+                  <a:pt x="8763" y="9128"/>
+                </a:lnTo>
+                <a:lnTo>
+                  <a:pt x="8763" y="0"/>
+                </a:lnTo>
+                <a:close/>
+              </a:path>
+            </a:pathLst>
+          </a:custGeom>
+          <a:solidFill>
+            <a:schemeClr val="tx2"/>
+          </a:solidFill>
+          <a:ln w="0">
+            <a:noFill/>
+            <a:prstDash val="solid"/>
+            <a:round/>
+            <a:headEnd/>
+            <a:tailEnd/>
+          </a:ln>
+        </p:spPr>
+      </p:sp>
+      <p:pic>
+        <p:nvPicPr>
+          <p:cNvPr id="1028" name="Picture 4">
+            <a:extLst>
+              <a:ext uri="{FF2B5EF4-FFF2-40B4-BE49-F238E27FC236}">
+                <a16:creationId xmlns:a16="http://schemas.microsoft.com/office/drawing/2014/main" id="{8992B4A4-E488-4C90-9141-D74EFE2B082C}"/>
+              </a:ext>
+            </a:extLst>
+          </p:cNvPr>
+          <p:cNvPicPr>
+            <a:picLocks noChangeAspect="1" noChangeArrowheads="1"/>
+          </p:cNvPicPr>
+          <p:nvPr/>
+        </p:nvPicPr>
+        <p:blipFill>
+          <a:blip r:embed="rId2">
+            <a:extLst>
+              <a:ext uri="{28A0092B-C50C-407E-A947-70E740481C1C}">
+                <a14:useLocalDpi xmlns:a14="http://schemas.microsoft.com/office/drawing/2010/main" val="0"/>
+              </a:ext>
+            </a:extLst>
+          </a:blip>
+          <a:stretch>
+            <a:fillRect/>
+          </a:stretch>
+        </p:blipFill>
+        <p:spPr bwMode="auto">
+          <a:xfrm>
+            <a:off x="1379023" y="1659095"/>
+            <a:ext cx="2749177" cy="1470809"/>
+          </a:xfrm>
+          <a:prstGeom prst="rect">
+            <a:avLst/>
+          </a:prstGeom>
+          <a:noFill/>
+          <a:extLst>
+            <a:ext uri="{909E8E84-426E-40DD-AFC4-6F175D3DCCD1}">
+              <a14:hiddenFill xmlns:a14="http://schemas.microsoft.com/office/drawing/2010/main">
+                <a:solidFill>
+                  <a:srgbClr val="FFFFFF"/>
+                </a:solidFill>
+              </a14:hiddenFill>
+            </a:ext>
+          </a:extLst>
+        </p:spPr>
+      </p:pic>
+      <p:pic>
+        <p:nvPicPr>
+          <p:cNvPr id="1026" name="Picture 2">
+            <a:extLst>
+              <a:ext uri="{FF2B5EF4-FFF2-40B4-BE49-F238E27FC236}">
+                <a16:creationId xmlns:a16="http://schemas.microsoft.com/office/drawing/2014/main" id="{2188EAF9-C0A9-4563-BEF8-E16694F93C36}"/>
+              </a:ext>
+            </a:extLst>
+          </p:cNvPr>
+          <p:cNvPicPr>
+            <a:picLocks noChangeAspect="1" noChangeArrowheads="1"/>
+          </p:cNvPicPr>
+          <p:nvPr/>
+        </p:nvPicPr>
+        <p:blipFill>
+          <a:blip r:embed="rId3">
+            <a:extLst>
+              <a:ext uri="{28A0092B-C50C-407E-A947-70E740481C1C}">
+                <a14:useLocalDpi xmlns:a14="http://schemas.microsoft.com/office/drawing/2010/main" val="0"/>
+              </a:ext>
+            </a:extLst>
+          </a:blip>
+          <a:stretch>
+            <a:fillRect/>
+          </a:stretch>
+        </p:blipFill>
+        <p:spPr bwMode="auto">
+          <a:xfrm>
+            <a:off x="1379023" y="3930722"/>
+            <a:ext cx="2749177" cy="1463936"/>
+          </a:xfrm>
+          <a:prstGeom prst="rect">
+            <a:avLst/>
+          </a:prstGeom>
+          <a:noFill/>
+          <a:extLst>
+            <a:ext uri="{909E8E84-426E-40DD-AFC4-6F175D3DCCD1}">
+              <a14:hiddenFill xmlns:a14="http://schemas.microsoft.com/office/drawing/2010/main">
+                <a:solidFill>
+                  <a:srgbClr val="FFFFFF"/>
+                </a:solidFill>
+              </a14:hiddenFill>
+            </a:ext>
+          </a:extLst>
+        </p:spPr>
+      </p:pic>
+      <p:sp>
+        <p:nvSpPr>
+          <p:cNvPr id="1037" name="Freeform 6">
+            <a:extLst>
+              <a:ext uri="{FF2B5EF4-FFF2-40B4-BE49-F238E27FC236}">
+                <a16:creationId xmlns:a16="http://schemas.microsoft.com/office/drawing/2014/main" id="{8A2DFE20-1EAE-45A9-AD16-D4DBD0ABBBC7}"/>
+              </a:ext>
+              <a:ext uri="{C183D7F6-B498-43B3-948B-1728B52AA6E4}">
+                <adec:decorative xmlns:adec="http://schemas.microsoft.com/office/drawing/2017/decorative" val="1"/>
+              </a:ext>
+            </a:extLst>
+          </p:cNvPr>
+          <p:cNvSpPr>
+            <a:spLocks noGrp="1" noRot="1" noChangeAspect="1" noMove="1" noResize="1" noEditPoints="1" noAdjustHandles="1" noChangeArrowheads="1" noChangeShapeType="1" noTextEdit="1"/>
+          </p:cNvSpPr>
+          <p:nvPr>
+            <p:extLst>
+              <p:ext uri="{386F3935-93C4-4BCD-93E2-E3B085C9AB24}">
+                <p16:designElem xmlns:p16="http://schemas.microsoft.com/office/powerpoint/2015/main" val="1"/>
+              </p:ext>
+            </p:extLst>
+          </p:nvPr>
+        </p:nvSpPr>
+        <p:spPr bwMode="auto">
+          <a:xfrm>
+            <a:off x="4494670" y="2016617"/>
+            <a:ext cx="3275013" cy="4408488"/>
+          </a:xfrm>
+          <a:custGeom>
+            <a:avLst/>
+            <a:gdLst/>
+            <a:ahLst/>
+            <a:cxnLst/>
+            <a:rect l="l" t="t" r="r" b="b"/>
+            <a:pathLst>
+              <a:path w="10000" h="10000">
+                <a:moveTo>
+                  <a:pt x="8761" y="0"/>
+                </a:moveTo>
+                <a:lnTo>
+                  <a:pt x="10000" y="0"/>
+                </a:lnTo>
+                <a:lnTo>
+                  <a:pt x="10000" y="10000"/>
+                </a:lnTo>
+                <a:lnTo>
+                  <a:pt x="0" y="10000"/>
+                </a:lnTo>
+                <a:lnTo>
+                  <a:pt x="0" y="9126"/>
+                </a:lnTo>
+                <a:lnTo>
+                  <a:pt x="8761" y="9127"/>
+                </a:lnTo>
+                <a:lnTo>
+                  <a:pt x="8761" y="0"/>
+                </a:lnTo>
+                <a:close/>
+              </a:path>
+            </a:pathLst>
+          </a:custGeom>
+          <a:solidFill>
+            <a:schemeClr val="tx2"/>
+          </a:solidFill>
+          <a:ln w="0">
+            <a:noFill/>
+            <a:prstDash val="solid"/>
+            <a:round/>
+            <a:headEnd/>
+            <a:tailEnd/>
+          </a:ln>
+        </p:spPr>
+      </p:sp>
+      <p:pic>
+        <p:nvPicPr>
+          <p:cNvPr id="1030" name="Picture 6">
+            <a:extLst>
+              <a:ext uri="{FF2B5EF4-FFF2-40B4-BE49-F238E27FC236}">
+                <a16:creationId xmlns:a16="http://schemas.microsoft.com/office/drawing/2014/main" id="{9423AB10-DE24-49F7-A477-777ED7F8CFB2}"/>
+              </a:ext>
+            </a:extLst>
+          </p:cNvPr>
+          <p:cNvPicPr>
+            <a:picLocks noChangeAspect="1" noChangeArrowheads="1"/>
+          </p:cNvPicPr>
+          <p:nvPr/>
+        </p:nvPicPr>
+        <p:blipFill>
+          <a:blip r:embed="rId4">
+            <a:extLst>
+              <a:ext uri="{28A0092B-C50C-407E-A947-70E740481C1C}">
+                <a14:useLocalDpi xmlns:a14="http://schemas.microsoft.com/office/drawing/2010/main" val="0"/>
+              </a:ext>
+            </a:extLst>
+          </a:blip>
+          <a:stretch>
+            <a:fillRect/>
+          </a:stretch>
+        </p:blipFill>
+        <p:spPr bwMode="auto">
+          <a:xfrm>
+            <a:off x="4289068" y="1665181"/>
+            <a:ext cx="2749177" cy="1457063"/>
+          </a:xfrm>
+          <a:prstGeom prst="rect">
+            <a:avLst/>
+          </a:prstGeom>
+          <a:noFill/>
+          <a:extLst>
+            <a:ext uri="{909E8E84-426E-40DD-AFC4-6F175D3DCCD1}">
+              <a14:hiddenFill xmlns:a14="http://schemas.microsoft.com/office/drawing/2010/main">
+                <a:solidFill>
+                  <a:srgbClr val="FFFFFF"/>
+                </a:solidFill>
+              </a14:hiddenFill>
+            </a:ext>
+          </a:extLst>
+        </p:spPr>
+      </p:pic>
+      <p:pic>
+        <p:nvPicPr>
+          <p:cNvPr id="1032" name="Picture 8">
+            <a:extLst>
+              <a:ext uri="{FF2B5EF4-FFF2-40B4-BE49-F238E27FC236}">
+                <a16:creationId xmlns:a16="http://schemas.microsoft.com/office/drawing/2014/main" id="{D6184290-0001-4A8B-AA11-E12D6E91A928}"/>
+              </a:ext>
+            </a:extLst>
+          </p:cNvPr>
+          <p:cNvPicPr>
+            <a:picLocks noChangeAspect="1" noChangeArrowheads="1"/>
+          </p:cNvPicPr>
+          <p:nvPr/>
+        </p:nvPicPr>
+        <p:blipFill>
+          <a:blip r:embed="rId5">
+            <a:extLst>
+              <a:ext uri="{28A0092B-C50C-407E-A947-70E740481C1C}">
+                <a14:useLocalDpi xmlns:a14="http://schemas.microsoft.com/office/drawing/2010/main" val="0"/>
+              </a:ext>
+            </a:extLst>
+          </a:blip>
+          <a:stretch>
+            <a:fillRect/>
+          </a:stretch>
+        </p:blipFill>
+        <p:spPr bwMode="auto">
+          <a:xfrm>
+            <a:off x="4289068" y="3941782"/>
+            <a:ext cx="2749177" cy="1450190"/>
+          </a:xfrm>
+          <a:prstGeom prst="rect">
+            <a:avLst/>
+          </a:prstGeom>
+          <a:noFill/>
+          <a:extLst>
+            <a:ext uri="{909E8E84-426E-40DD-AFC4-6F175D3DCCD1}">
+              <a14:hiddenFill xmlns:a14="http://schemas.microsoft.com/office/drawing/2010/main">
+                <a:solidFill>
+                  <a:srgbClr val="FFFFFF"/>
+                </a:solidFill>
+              </a14:hiddenFill>
+            </a:ext>
+          </a:extLst>
+        </p:spPr>
+      </p:pic>
+    </p:spTree>
+    <p:extLst>
+      <p:ext uri="{BB962C8B-B14F-4D97-AF65-F5344CB8AC3E}">
+        <p14:creationId xmlns:p14="http://schemas.microsoft.com/office/powerpoint/2010/main" val="946576947"/>
       </p:ext>
     </p:extLst>
   </p:cSld>

</xml_diff>